<commit_message>
Add pipelin description. Rename Aarray -> AArray.
</commit_message>
<xml_diff>
--- a/src/site/asciidoc/design/ThePipeline/ThePipeline.pptx
+++ b/src/site/asciidoc/design/ThePipeline/ThePipeline.pptx
@@ -4,6 +4,9 @@
   <p:sldMasterIdLst>
     <p:sldMasterId id="2147483648" r:id="rId1"/>
   </p:sldMasterIdLst>
+  <p:notesMasterIdLst>
+    <p:notesMasterId r:id="rId4"/>
+  </p:notesMasterIdLst>
   <p:sldIdLst>
     <p:sldId id="258" r:id="rId2"/>
     <p:sldId id="256" r:id="rId3"/>
@@ -124,6 +127,468 @@
 </p:presentation>
 </file>
 
+<file path=ppt/notesMasters/notesMaster1.xml><?xml version="1.0" encoding="utf-8"?>
+<p:notesMaster xmlns:a="http://schemas.openxmlformats.org/drawingml/2006/main" xmlns:r="http://schemas.openxmlformats.org/officeDocument/2006/relationships" xmlns:p="http://schemas.openxmlformats.org/presentationml/2006/main">
+  <p:cSld>
+    <p:bg>
+      <p:bgRef idx="1001">
+        <a:schemeClr val="bg1"/>
+      </p:bgRef>
+    </p:bg>
+    <p:spTree>
+      <p:nvGrpSpPr>
+        <p:cNvPr id="1" name=""/>
+        <p:cNvGrpSpPr/>
+        <p:nvPr/>
+      </p:nvGrpSpPr>
+      <p:grpSpPr>
+        <a:xfrm>
+          <a:off x="0" y="0"/>
+          <a:ext cx="0" cy="0"/>
+          <a:chOff x="0" y="0"/>
+          <a:chExt cx="0" cy="0"/>
+        </a:xfrm>
+      </p:grpSpPr>
+      <p:sp>
+        <p:nvSpPr>
+          <p:cNvPr id="2" name="Header Placeholder 1"/>
+          <p:cNvSpPr>
+            <a:spLocks noGrp="1"/>
+          </p:cNvSpPr>
+          <p:nvPr>
+            <p:ph type="hdr" sz="quarter"/>
+          </p:nvPr>
+        </p:nvSpPr>
+        <p:spPr>
+          <a:xfrm>
+            <a:off x="0" y="0"/>
+            <a:ext cx="3962400" cy="344488"/>
+          </a:xfrm>
+          <a:prstGeom prst="rect">
+            <a:avLst/>
+          </a:prstGeom>
+        </p:spPr>
+        <p:txBody>
+          <a:bodyPr vert="horz" lIns="91440" tIns="45720" rIns="91440" bIns="45720" rtlCol="0"/>
+          <a:lstStyle>
+            <a:lvl1pPr algn="l">
+              <a:defRPr sz="1200"/>
+            </a:lvl1pPr>
+          </a:lstStyle>
+          <a:p>
+            <a:endParaRPr lang="en-JP"/>
+          </a:p>
+        </p:txBody>
+      </p:sp>
+      <p:sp>
+        <p:nvSpPr>
+          <p:cNvPr id="3" name="Date Placeholder 2"/>
+          <p:cNvSpPr>
+            <a:spLocks noGrp="1"/>
+          </p:cNvSpPr>
+          <p:nvPr>
+            <p:ph type="dt" idx="1"/>
+          </p:nvPr>
+        </p:nvSpPr>
+        <p:spPr>
+          <a:xfrm>
+            <a:off x="5180013" y="0"/>
+            <a:ext cx="3962400" cy="344488"/>
+          </a:xfrm>
+          <a:prstGeom prst="rect">
+            <a:avLst/>
+          </a:prstGeom>
+        </p:spPr>
+        <p:txBody>
+          <a:bodyPr vert="horz" lIns="91440" tIns="45720" rIns="91440" bIns="45720" rtlCol="0"/>
+          <a:lstStyle>
+            <a:lvl1pPr algn="r">
+              <a:defRPr sz="1200"/>
+            </a:lvl1pPr>
+          </a:lstStyle>
+          <a:p>
+            <a:fld id="{ECEC7670-E8CE-714A-A967-E0A6D9BE1E06}" type="datetimeFigureOut">
+              <a:rPr lang="en-JP" smtClean="0"/>
+              <a:t>2022/02/22</a:t>
+            </a:fld>
+            <a:endParaRPr lang="en-JP"/>
+          </a:p>
+        </p:txBody>
+      </p:sp>
+      <p:sp>
+        <p:nvSpPr>
+          <p:cNvPr id="4" name="Slide Image Placeholder 3"/>
+          <p:cNvSpPr>
+            <a:spLocks noGrp="1" noRot="1" noChangeAspect="1"/>
+          </p:cNvSpPr>
+          <p:nvPr>
+            <p:ph type="sldImg" idx="2"/>
+          </p:nvPr>
+        </p:nvSpPr>
+        <p:spPr>
+          <a:xfrm>
+            <a:off x="3702050" y="857250"/>
+            <a:ext cx="1739900" cy="2314575"/>
+          </a:xfrm>
+          <a:prstGeom prst="rect">
+            <a:avLst/>
+          </a:prstGeom>
+          <a:noFill/>
+          <a:ln w="12700">
+            <a:solidFill>
+              <a:prstClr val="black"/>
+            </a:solidFill>
+          </a:ln>
+        </p:spPr>
+        <p:txBody>
+          <a:bodyPr vert="horz" lIns="91440" tIns="45720" rIns="91440" bIns="45720" rtlCol="0" anchor="ctr"/>
+          <a:lstStyle/>
+          <a:p>
+            <a:endParaRPr lang="en-JP"/>
+          </a:p>
+        </p:txBody>
+      </p:sp>
+      <p:sp>
+        <p:nvSpPr>
+          <p:cNvPr id="5" name="Notes Placeholder 4"/>
+          <p:cNvSpPr>
+            <a:spLocks noGrp="1"/>
+          </p:cNvSpPr>
+          <p:nvPr>
+            <p:ph type="body" sz="quarter" idx="3"/>
+          </p:nvPr>
+        </p:nvSpPr>
+        <p:spPr>
+          <a:xfrm>
+            <a:off x="914400" y="3300413"/>
+            <a:ext cx="7315200" cy="2700337"/>
+          </a:xfrm>
+          <a:prstGeom prst="rect">
+            <a:avLst/>
+          </a:prstGeom>
+        </p:spPr>
+        <p:txBody>
+          <a:bodyPr vert="horz" lIns="91440" tIns="45720" rIns="91440" bIns="45720" rtlCol="0"/>
+          <a:lstStyle/>
+          <a:p>
+            <a:pPr lvl="0"/>
+            <a:r>
+              <a:rPr lang="en-US"/>
+              <a:t>Click to edit Master text styles</a:t>
+            </a:r>
+          </a:p>
+          <a:p>
+            <a:pPr lvl="1"/>
+            <a:r>
+              <a:rPr lang="en-US"/>
+              <a:t>Second level</a:t>
+            </a:r>
+          </a:p>
+          <a:p>
+            <a:pPr lvl="2"/>
+            <a:r>
+              <a:rPr lang="en-US"/>
+              <a:t>Third level</a:t>
+            </a:r>
+          </a:p>
+          <a:p>
+            <a:pPr lvl="3"/>
+            <a:r>
+              <a:rPr lang="en-US"/>
+              <a:t>Fourth level</a:t>
+            </a:r>
+          </a:p>
+          <a:p>
+            <a:pPr lvl="4"/>
+            <a:r>
+              <a:rPr lang="en-US"/>
+              <a:t>Fifth level</a:t>
+            </a:r>
+            <a:endParaRPr lang="en-JP"/>
+          </a:p>
+        </p:txBody>
+      </p:sp>
+      <p:sp>
+        <p:nvSpPr>
+          <p:cNvPr id="6" name="Footer Placeholder 5"/>
+          <p:cNvSpPr>
+            <a:spLocks noGrp="1"/>
+          </p:cNvSpPr>
+          <p:nvPr>
+            <p:ph type="ftr" sz="quarter" idx="4"/>
+          </p:nvPr>
+        </p:nvSpPr>
+        <p:spPr>
+          <a:xfrm>
+            <a:off x="0" y="6513513"/>
+            <a:ext cx="3962400" cy="344487"/>
+          </a:xfrm>
+          <a:prstGeom prst="rect">
+            <a:avLst/>
+          </a:prstGeom>
+        </p:spPr>
+        <p:txBody>
+          <a:bodyPr vert="horz" lIns="91440" tIns="45720" rIns="91440" bIns="45720" rtlCol="0" anchor="b"/>
+          <a:lstStyle>
+            <a:lvl1pPr algn="l">
+              <a:defRPr sz="1200"/>
+            </a:lvl1pPr>
+          </a:lstStyle>
+          <a:p>
+            <a:endParaRPr lang="en-JP"/>
+          </a:p>
+        </p:txBody>
+      </p:sp>
+      <p:sp>
+        <p:nvSpPr>
+          <p:cNvPr id="7" name="Slide Number Placeholder 6"/>
+          <p:cNvSpPr>
+            <a:spLocks noGrp="1"/>
+          </p:cNvSpPr>
+          <p:nvPr>
+            <p:ph type="sldNum" sz="quarter" idx="5"/>
+          </p:nvPr>
+        </p:nvSpPr>
+        <p:spPr>
+          <a:xfrm>
+            <a:off x="5180013" y="6513513"/>
+            <a:ext cx="3962400" cy="344487"/>
+          </a:xfrm>
+          <a:prstGeom prst="rect">
+            <a:avLst/>
+          </a:prstGeom>
+        </p:spPr>
+        <p:txBody>
+          <a:bodyPr vert="horz" lIns="91440" tIns="45720" rIns="91440" bIns="45720" rtlCol="0" anchor="b"/>
+          <a:lstStyle>
+            <a:lvl1pPr algn="r">
+              <a:defRPr sz="1200"/>
+            </a:lvl1pPr>
+          </a:lstStyle>
+          <a:p>
+            <a:fld id="{DBAD0628-8D93-E94F-9E90-D7EDDE2ED15D}" type="slidenum">
+              <a:rPr lang="en-JP" smtClean="0"/>
+              <a:t>‹#›</a:t>
+            </a:fld>
+            <a:endParaRPr lang="en-JP"/>
+          </a:p>
+        </p:txBody>
+      </p:sp>
+    </p:spTree>
+    <p:extLst>
+      <p:ext uri="{BB962C8B-B14F-4D97-AF65-F5344CB8AC3E}">
+        <p14:creationId xmlns:p14="http://schemas.microsoft.com/office/powerpoint/2010/main" val="2696481260"/>
+      </p:ext>
+    </p:extLst>
+  </p:cSld>
+  <p:clrMap bg1="lt1" tx1="dk1" bg2="lt2" tx2="dk2" accent1="accent1" accent2="accent2" accent3="accent3" accent4="accent4" accent5="accent5" accent6="accent6" hlink="hlink" folHlink="folHlink"/>
+  <p:notesStyle>
+    <a:lvl1pPr marL="0" algn="l" defTabSz="914400" rtl="0" eaLnBrk="1" latinLnBrk="0" hangingPunct="1">
+      <a:defRPr sz="1200" kern="1200">
+        <a:solidFill>
+          <a:schemeClr val="tx1"/>
+        </a:solidFill>
+        <a:latin typeface="+mn-lt"/>
+        <a:ea typeface="+mn-ea"/>
+        <a:cs typeface="+mn-cs"/>
+      </a:defRPr>
+    </a:lvl1pPr>
+    <a:lvl2pPr marL="457200" algn="l" defTabSz="914400" rtl="0" eaLnBrk="1" latinLnBrk="0" hangingPunct="1">
+      <a:defRPr sz="1200" kern="1200">
+        <a:solidFill>
+          <a:schemeClr val="tx1"/>
+        </a:solidFill>
+        <a:latin typeface="+mn-lt"/>
+        <a:ea typeface="+mn-ea"/>
+        <a:cs typeface="+mn-cs"/>
+      </a:defRPr>
+    </a:lvl2pPr>
+    <a:lvl3pPr marL="914400" algn="l" defTabSz="914400" rtl="0" eaLnBrk="1" latinLnBrk="0" hangingPunct="1">
+      <a:defRPr sz="1200" kern="1200">
+        <a:solidFill>
+          <a:schemeClr val="tx1"/>
+        </a:solidFill>
+        <a:latin typeface="+mn-lt"/>
+        <a:ea typeface="+mn-ea"/>
+        <a:cs typeface="+mn-cs"/>
+      </a:defRPr>
+    </a:lvl3pPr>
+    <a:lvl4pPr marL="1371600" algn="l" defTabSz="914400" rtl="0" eaLnBrk="1" latinLnBrk="0" hangingPunct="1">
+      <a:defRPr sz="1200" kern="1200">
+        <a:solidFill>
+          <a:schemeClr val="tx1"/>
+        </a:solidFill>
+        <a:latin typeface="+mn-lt"/>
+        <a:ea typeface="+mn-ea"/>
+        <a:cs typeface="+mn-cs"/>
+      </a:defRPr>
+    </a:lvl4pPr>
+    <a:lvl5pPr marL="1828800" algn="l" defTabSz="914400" rtl="0" eaLnBrk="1" latinLnBrk="0" hangingPunct="1">
+      <a:defRPr sz="1200" kern="1200">
+        <a:solidFill>
+          <a:schemeClr val="tx1"/>
+        </a:solidFill>
+        <a:latin typeface="+mn-lt"/>
+        <a:ea typeface="+mn-ea"/>
+        <a:cs typeface="+mn-cs"/>
+      </a:defRPr>
+    </a:lvl5pPr>
+    <a:lvl6pPr marL="2286000" algn="l" defTabSz="914400" rtl="0" eaLnBrk="1" latinLnBrk="0" hangingPunct="1">
+      <a:defRPr sz="1200" kern="1200">
+        <a:solidFill>
+          <a:schemeClr val="tx1"/>
+        </a:solidFill>
+        <a:latin typeface="+mn-lt"/>
+        <a:ea typeface="+mn-ea"/>
+        <a:cs typeface="+mn-cs"/>
+      </a:defRPr>
+    </a:lvl6pPr>
+    <a:lvl7pPr marL="2743200" algn="l" defTabSz="914400" rtl="0" eaLnBrk="1" latinLnBrk="0" hangingPunct="1">
+      <a:defRPr sz="1200" kern="1200">
+        <a:solidFill>
+          <a:schemeClr val="tx1"/>
+        </a:solidFill>
+        <a:latin typeface="+mn-lt"/>
+        <a:ea typeface="+mn-ea"/>
+        <a:cs typeface="+mn-cs"/>
+      </a:defRPr>
+    </a:lvl7pPr>
+    <a:lvl8pPr marL="3200400" algn="l" defTabSz="914400" rtl="0" eaLnBrk="1" latinLnBrk="0" hangingPunct="1">
+      <a:defRPr sz="1200" kern="1200">
+        <a:solidFill>
+          <a:schemeClr val="tx1"/>
+        </a:solidFill>
+        <a:latin typeface="+mn-lt"/>
+        <a:ea typeface="+mn-ea"/>
+        <a:cs typeface="+mn-cs"/>
+      </a:defRPr>
+    </a:lvl8pPr>
+    <a:lvl9pPr marL="3657600" algn="l" defTabSz="914400" rtl="0" eaLnBrk="1" latinLnBrk="0" hangingPunct="1">
+      <a:defRPr sz="1200" kern="1200">
+        <a:solidFill>
+          <a:schemeClr val="tx1"/>
+        </a:solidFill>
+        <a:latin typeface="+mn-lt"/>
+        <a:ea typeface="+mn-ea"/>
+        <a:cs typeface="+mn-cs"/>
+      </a:defRPr>
+    </a:lvl9pPr>
+  </p:notesStyle>
+</p:notesMaster>
+</file>
+
+<file path=ppt/notesSlides/notesSlide1.xml><?xml version="1.0" encoding="utf-8"?>
+<p:notes xmlns:a="http://schemas.openxmlformats.org/drawingml/2006/main" xmlns:r="http://schemas.openxmlformats.org/officeDocument/2006/relationships" xmlns:p="http://schemas.openxmlformats.org/presentationml/2006/main">
+  <p:cSld>
+    <p:spTree>
+      <p:nvGrpSpPr>
+        <p:cNvPr id="1" name=""/>
+        <p:cNvGrpSpPr/>
+        <p:nvPr/>
+      </p:nvGrpSpPr>
+      <p:grpSpPr>
+        <a:xfrm>
+          <a:off x="0" y="0"/>
+          <a:ext cx="0" cy="0"/>
+          <a:chOff x="0" y="0"/>
+          <a:chExt cx="0" cy="0"/>
+        </a:xfrm>
+      </p:grpSpPr>
+      <p:sp>
+        <p:nvSpPr>
+          <p:cNvPr id="2" name="Slide Image Placeholder 1"/>
+          <p:cNvSpPr>
+            <a:spLocks noGrp="1" noRot="1" noChangeAspect="1"/>
+          </p:cNvSpPr>
+          <p:nvPr>
+            <p:ph type="sldImg"/>
+          </p:nvPr>
+        </p:nvSpPr>
+        <p:spPr/>
+      </p:sp>
+      <p:sp>
+        <p:nvSpPr>
+          <p:cNvPr id="3" name="Notes Placeholder 2"/>
+          <p:cNvSpPr>
+            <a:spLocks noGrp="1"/>
+          </p:cNvSpPr>
+          <p:nvPr>
+            <p:ph type="body" idx="1"/>
+          </p:nvPr>
+        </p:nvSpPr>
+        <p:spPr/>
+        <p:txBody>
+          <a:bodyPr/>
+          <a:lstStyle/>
+          <a:p>
+            <a:pPr marL="0" marR="0" lvl="0" indent="0" algn="l" defTabSz="914400" rtl="0" eaLnBrk="1" fontAlgn="auto" latinLnBrk="0" hangingPunct="1">
+              <a:lnSpc>
+                <a:spcPct val="100000"/>
+              </a:lnSpc>
+              <a:spcBef>
+                <a:spcPts val="0"/>
+              </a:spcBef>
+              <a:spcAft>
+                <a:spcPts val="0"/>
+              </a:spcAft>
+              <a:buClrTx/>
+              <a:buSzTx/>
+              <a:buFontTx/>
+              <a:buNone/>
+              <a:tabLst/>
+              <a:defRPr/>
+            </a:pPr>
+            <a:r>
+              <a:rPr lang="en-JP" dirty="0"/>
+              <a:t>Non-Simple-Parameter-Constraint Handling Branch: </a:t>
+            </a:r>
+            <a:r>
+              <a:rPr lang="en-US" sz="1200"/>
+              <a:t>For each non-simple parameter involved in any constraint, create an independent parameter space that contains the parameter only</a:t>
+            </a:r>
+          </a:p>
+          <a:p>
+            <a:pPr algn="l"/>
+            <a:endParaRPr lang="en-JP" dirty="0"/>
+          </a:p>
+        </p:txBody>
+      </p:sp>
+      <p:sp>
+        <p:nvSpPr>
+          <p:cNvPr id="4" name="Slide Number Placeholder 3"/>
+          <p:cNvSpPr>
+            <a:spLocks noGrp="1"/>
+          </p:cNvSpPr>
+          <p:nvPr>
+            <p:ph type="sldNum" sz="quarter" idx="5"/>
+          </p:nvPr>
+        </p:nvSpPr>
+        <p:spPr/>
+        <p:txBody>
+          <a:bodyPr/>
+          <a:lstStyle/>
+          <a:p>
+            <a:fld id="{DBAD0628-8D93-E94F-9E90-D7EDDE2ED15D}" type="slidenum">
+              <a:rPr lang="en-JP" smtClean="0"/>
+              <a:t>1</a:t>
+            </a:fld>
+            <a:endParaRPr lang="en-JP"/>
+          </a:p>
+        </p:txBody>
+      </p:sp>
+    </p:spTree>
+    <p:extLst>
+      <p:ext uri="{BB962C8B-B14F-4D97-AF65-F5344CB8AC3E}">
+        <p14:creationId xmlns:p14="http://schemas.microsoft.com/office/powerpoint/2010/main" val="3104424551"/>
+      </p:ext>
+    </p:extLst>
+  </p:cSld>
+  <p:clrMapOvr>
+    <a:masterClrMapping/>
+  </p:clrMapOvr>
+</p:notes>
+</file>
+
 <file path=ppt/slideLayouts/slideLayout1.xml><?xml version="1.0" encoding="utf-8"?>
 <p:sldLayout xmlns:a="http://schemas.openxmlformats.org/drawingml/2006/main" xmlns:r="http://schemas.openxmlformats.org/officeDocument/2006/relationships" xmlns:p="http://schemas.openxmlformats.org/presentationml/2006/main" type="title" preserve="1">
   <p:cSld name="Title Slide">
@@ -324,7 +789,7 @@
           <a:p>
             <a:fld id="{216C5678-EE20-4FA5-88E2-6E0BD67A2E26}" type="datetime1">
               <a:rPr lang="en-US" smtClean="0"/>
-              <a:t>2/11/22</a:t>
+              <a:t>2/22/22</a:t>
             </a:fld>
             <a:endParaRPr lang="en-US" dirty="0"/>
           </a:p>
@@ -517,7 +982,7 @@
           <a:p>
             <a:fld id="{EA051B39-B140-43FE-96DB-472A2B59CE7C}" type="datetime1">
               <a:rPr lang="en-US" smtClean="0"/>
-              <a:t>2/11/22</a:t>
+              <a:t>2/22/22</a:t>
             </a:fld>
             <a:endParaRPr lang="en-US"/>
           </a:p>
@@ -719,7 +1184,7 @@
           <a:p>
             <a:fld id="{DA600BB2-27C5-458B-ABCE-839C88CF47CE}" type="datetime1">
               <a:rPr lang="en-US" smtClean="0"/>
-              <a:t>2/11/22</a:t>
+              <a:t>2/22/22</a:t>
             </a:fld>
             <a:endParaRPr lang="en-US"/>
           </a:p>
@@ -930,7 +1395,7 @@
           <a:p>
             <a:fld id="{B11D738E-8962-435F-8C43-147B8DD7E819}" type="datetime1">
               <a:rPr lang="en-US" smtClean="0"/>
-              <a:t>2/11/22</a:t>
+              <a:t>2/22/22</a:t>
             </a:fld>
             <a:endParaRPr lang="en-US"/>
           </a:p>
@@ -1220,7 +1685,7 @@
           <a:p>
             <a:fld id="{09CAEA93-55E7-4DA9-90C2-089A26EEFEC4}" type="datetime1">
               <a:rPr lang="en-US" smtClean="0"/>
-              <a:t>2/11/22</a:t>
+              <a:t>2/22/22</a:t>
             </a:fld>
             <a:endParaRPr lang="en-US"/>
           </a:p>
@@ -1595,7 +2060,7 @@
           <a:p>
             <a:fld id="{E34CF3C7-6809-4F39-BD67-A75817BDDE0A}" type="datetime1">
               <a:rPr lang="en-US" smtClean="0"/>
-              <a:t>2/11/22</a:t>
+              <a:t>2/22/22</a:t>
             </a:fld>
             <a:endParaRPr lang="en-US"/>
           </a:p>
@@ -1929,7 +2394,7 @@
           <a:p>
             <a:fld id="{F7EAEB24-CE78-465C-A726-91D0868FA48F}" type="datetime1">
               <a:rPr lang="en-US" smtClean="0"/>
-              <a:t>2/11/22</a:t>
+              <a:t>2/22/22</a:t>
             </a:fld>
             <a:endParaRPr lang="en-US"/>
           </a:p>
@@ -2184,7 +2649,7 @@
           <a:p>
             <a:fld id="{40BAADF0-1749-4E8B-9691-B44A5F8C0895}" type="datetime1">
               <a:rPr lang="en-US" smtClean="0"/>
-              <a:t>2/11/22</a:t>
+              <a:t>2/22/22</a:t>
             </a:fld>
             <a:endParaRPr lang="en-US"/>
           </a:p>
@@ -2302,7 +2767,7 @@
           <a:p>
             <a:fld id="{A8AF628A-A867-4937-BBE5-207DB6F9C51A}" type="datetime1">
               <a:rPr lang="en-US" smtClean="0"/>
-              <a:t>2/11/22</a:t>
+              <a:t>2/22/22</a:t>
             </a:fld>
             <a:endParaRPr lang="en-US"/>
           </a:p>
@@ -2618,7 +3083,7 @@
           <a:p>
             <a:fld id="{118BBB94-68E6-4675-A946-F1C5994EDBD7}" type="datetime1">
               <a:rPr lang="en-US" smtClean="0"/>
-              <a:t>2/11/22</a:t>
+              <a:t>2/22/22</a:t>
             </a:fld>
             <a:endParaRPr lang="en-US"/>
           </a:p>
@@ -2915,7 +3380,7 @@
           <a:p>
             <a:fld id="{DC3B8377-21E3-4835-B75D-4E2847E2750F}" type="datetime1">
               <a:rPr lang="en-US" smtClean="0"/>
-              <a:t>2/11/22</a:t>
+              <a:t>2/22/22</a:t>
             </a:fld>
             <a:endParaRPr lang="en-US"/>
           </a:p>
@@ -3443,8 +3908,8 @@
         </p:nvCxnSpPr>
         <p:spPr>
           <a:xfrm flipH="1" flipV="1">
-            <a:off x="2299848" y="8140778"/>
-            <a:ext cx="1497881" cy="434209"/>
+            <a:off x="1850146" y="8233542"/>
+            <a:ext cx="4361497" cy="485412"/>
           </a:xfrm>
           <a:prstGeom prst="straightConnector1">
             <a:avLst/>
@@ -3468,84 +3933,6 @@
           </a:fontRef>
         </p:style>
       </p:cxnSp>
-      <p:sp>
-        <p:nvSpPr>
-          <p:cNvPr id="152" name="Rectangle 151"/>
-          <p:cNvSpPr/>
-          <p:nvPr/>
-        </p:nvSpPr>
-        <p:spPr>
-          <a:xfrm>
-            <a:off x="2632783" y="2039791"/>
-            <a:ext cx="3979874" cy="1152674"/>
-          </a:xfrm>
-          <a:prstGeom prst="rect">
-            <a:avLst/>
-          </a:prstGeom>
-          <a:noFill/>
-        </p:spPr>
-        <p:style>
-          <a:lnRef idx="1">
-            <a:schemeClr val="accent1"/>
-          </a:lnRef>
-          <a:fillRef idx="3">
-            <a:schemeClr val="accent1"/>
-          </a:fillRef>
-          <a:effectRef idx="2">
-            <a:schemeClr val="accent1"/>
-          </a:effectRef>
-          <a:fontRef idx="minor">
-            <a:schemeClr val="lt1"/>
-          </a:fontRef>
-        </p:style>
-        <p:txBody>
-          <a:bodyPr rtlCol="0" anchor="ctr"/>
-          <a:lstStyle/>
-          <a:p>
-            <a:pPr algn="ctr"/>
-            <a:endParaRPr lang="en-US"/>
-          </a:p>
-        </p:txBody>
-      </p:sp>
-      <p:sp>
-        <p:nvSpPr>
-          <p:cNvPr id="149" name="Rectangle 148"/>
-          <p:cNvSpPr/>
-          <p:nvPr/>
-        </p:nvSpPr>
-        <p:spPr>
-          <a:xfrm>
-            <a:off x="2693772" y="4812696"/>
-            <a:ext cx="4056784" cy="491826"/>
-          </a:xfrm>
-          <a:prstGeom prst="rect">
-            <a:avLst/>
-          </a:prstGeom>
-          <a:noFill/>
-        </p:spPr>
-        <p:style>
-          <a:lnRef idx="1">
-            <a:schemeClr val="accent1"/>
-          </a:lnRef>
-          <a:fillRef idx="3">
-            <a:schemeClr val="accent1"/>
-          </a:fillRef>
-          <a:effectRef idx="2">
-            <a:schemeClr val="accent1"/>
-          </a:effectRef>
-          <a:fontRef idx="minor">
-            <a:schemeClr val="lt1"/>
-          </a:fontRef>
-        </p:style>
-        <p:txBody>
-          <a:bodyPr rtlCol="0" anchor="ctr"/>
-          <a:lstStyle/>
-          <a:p>
-            <a:pPr algn="ctr"/>
-            <a:endParaRPr lang="en-US"/>
-          </a:p>
-        </p:txBody>
-      </p:sp>
       <p:grpSp>
         <p:nvGrpSpPr>
           <p:cNvPr id="4" name="Group 3"/>
@@ -3554,7 +3941,7 @@
         </p:nvGrpSpPr>
         <p:grpSpPr>
           <a:xfrm>
-            <a:off x="1449704" y="24376"/>
+            <a:off x="740715" y="24376"/>
             <a:ext cx="2201922" cy="966971"/>
             <a:chOff x="1846232" y="121664"/>
             <a:chExt cx="2201922" cy="966971"/>
@@ -3979,7 +4366,7 @@
         </p:nvSpPr>
         <p:spPr>
           <a:xfrm>
-            <a:off x="2104664" y="1279308"/>
+            <a:off x="1395675" y="1279308"/>
             <a:ext cx="890486" cy="245900"/>
           </a:xfrm>
           <a:prstGeom prst="roundRect">
@@ -4028,7 +4415,7 @@
         </p:nvCxnSpPr>
         <p:spPr>
           <a:xfrm flipV="1">
-            <a:off x="2549907" y="991344"/>
+            <a:off x="1840918" y="991344"/>
             <a:ext cx="758" cy="287964"/>
           </a:xfrm>
           <a:prstGeom prst="straightConnector1">
@@ -4063,9 +4450,9 @@
           <p:nvPr/>
         </p:nvCxnSpPr>
         <p:spPr>
-          <a:xfrm flipH="1">
-            <a:off x="1283751" y="1525208"/>
-            <a:ext cx="1266156" cy="705191"/>
+          <a:xfrm>
+            <a:off x="1840918" y="1525208"/>
+            <a:ext cx="2684" cy="705191"/>
           </a:xfrm>
           <a:prstGeom prst="straightConnector1">
             <a:avLst/>
@@ -4098,7 +4485,7 @@
         </p:nvSpPr>
         <p:spPr>
           <a:xfrm>
-            <a:off x="182790" y="2230399"/>
+            <a:off x="742641" y="2230399"/>
             <a:ext cx="2201922" cy="774526"/>
           </a:xfrm>
           <a:prstGeom prst="rect">
@@ -4139,7 +4526,7 @@
         </p:nvSpPr>
         <p:spPr>
           <a:xfrm>
-            <a:off x="954726" y="2632928"/>
+            <a:off x="1554333" y="2632928"/>
             <a:ext cx="196439" cy="190572"/>
           </a:xfrm>
           <a:prstGeom prst="rect">
@@ -4180,7 +4567,7 @@
         </p:nvSpPr>
         <p:spPr>
           <a:xfrm>
-            <a:off x="1186886" y="2632920"/>
+            <a:off x="1786493" y="2632920"/>
             <a:ext cx="196439" cy="190572"/>
           </a:xfrm>
           <a:prstGeom prst="rect">
@@ -4221,7 +4608,7 @@
         </p:nvSpPr>
         <p:spPr>
           <a:xfrm>
-            <a:off x="1997978" y="2632890"/>
+            <a:off x="2597585" y="2632890"/>
             <a:ext cx="196439" cy="190572"/>
           </a:xfrm>
           <a:prstGeom prst="rect">
@@ -4265,7 +4652,7 @@
         </p:nvSpPr>
         <p:spPr>
           <a:xfrm>
-            <a:off x="716622" y="2632928"/>
+            <a:off x="1316229" y="2632928"/>
             <a:ext cx="196439" cy="190572"/>
           </a:xfrm>
           <a:prstGeom prst="rect">
@@ -4309,7 +4696,7 @@
         </p:nvCxnSpPr>
         <p:spPr>
           <a:xfrm rot="16200000" flipH="1" flipV="1">
-            <a:off x="1690634" y="2227359"/>
+            <a:off x="2290241" y="2227359"/>
             <a:ext cx="30" cy="811092"/>
           </a:xfrm>
           <a:prstGeom prst="bentConnector3">
@@ -4344,7 +4731,7 @@
         </p:nvSpPr>
         <p:spPr>
           <a:xfrm>
-            <a:off x="500539" y="2632928"/>
+            <a:off x="1100146" y="2632928"/>
             <a:ext cx="216083" cy="190572"/>
           </a:xfrm>
           <a:prstGeom prst="rect">
@@ -4419,7 +4806,7 @@
         </p:nvGrpSpPr>
         <p:grpSpPr>
           <a:xfrm>
-            <a:off x="2767396" y="2219726"/>
+            <a:off x="3829615" y="2219725"/>
             <a:ext cx="2201922" cy="785200"/>
             <a:chOff x="2874840" y="2017718"/>
             <a:chExt cx="2201922" cy="785200"/>
@@ -4601,8 +4988,8 @@
         </p:nvCxnSpPr>
         <p:spPr>
           <a:xfrm>
-            <a:off x="2549907" y="1525208"/>
-            <a:ext cx="1318450" cy="694518"/>
+            <a:off x="1840918" y="1525208"/>
+            <a:ext cx="3089658" cy="694517"/>
           </a:xfrm>
           <a:prstGeom prst="straightConnector1">
             <a:avLst/>
@@ -4610,76 +4997,6 @@
           <a:ln>
             <a:prstDash val="sysDash"/>
             <a:tailEnd type="arrow"/>
-          </a:ln>
-        </p:spPr>
-        <p:style>
-          <a:lnRef idx="2">
-            <a:schemeClr val="accent1"/>
-          </a:lnRef>
-          <a:fillRef idx="0">
-            <a:schemeClr val="accent1"/>
-          </a:fillRef>
-          <a:effectRef idx="1">
-            <a:schemeClr val="accent1"/>
-          </a:effectRef>
-          <a:fontRef idx="minor">
-            <a:schemeClr val="tx1"/>
-          </a:fontRef>
-        </p:style>
-      </p:cxnSp>
-      <p:sp>
-        <p:nvSpPr>
-          <p:cNvPr id="46" name="TextBox 45"/>
-          <p:cNvSpPr txBox="1"/>
-          <p:nvPr/>
-        </p:nvSpPr>
-        <p:spPr>
-          <a:xfrm>
-            <a:off x="6708695" y="2196827"/>
-            <a:ext cx="2435305" cy="830997"/>
-          </a:xfrm>
-          <a:prstGeom prst="rect">
-            <a:avLst/>
-          </a:prstGeom>
-          <a:noFill/>
-          <a:ln>
-            <a:solidFill>
-              <a:schemeClr val="tx2"/>
-            </a:solidFill>
-          </a:ln>
-        </p:spPr>
-        <p:txBody>
-          <a:bodyPr wrap="square" rtlCol="0">
-            <a:spAutoFit/>
-          </a:bodyPr>
-          <a:lstStyle/>
-          <a:p>
-            <a:r>
-              <a:rPr lang="en-US" sz="1200" dirty="0"/>
-              <a:t>For each non-simple parameter involved in any constraint, create an independent parameter space that contains the parameter only</a:t>
-            </a:r>
-          </a:p>
-        </p:txBody>
-      </p:sp>
-      <p:cxnSp>
-        <p:nvCxnSpPr>
-          <p:cNvPr id="47" name="Straight Connector 46"/>
-          <p:cNvCxnSpPr>
-            <a:stCxn id="30" idx="1"/>
-            <a:endCxn id="5" idx="3"/>
-          </p:cNvCxnSpPr>
-          <p:nvPr/>
-        </p:nvCxnSpPr>
-        <p:spPr>
-          <a:xfrm flipH="1">
-            <a:off x="3651626" y="472763"/>
-            <a:ext cx="2890872" cy="35099"/>
-          </a:xfrm>
-          <a:prstGeom prst="line">
-            <a:avLst/>
-          </a:prstGeom>
-          <a:ln>
-            <a:prstDash val="sysDot"/>
           </a:ln>
         </p:spPr>
         <p:style>
@@ -4699,18 +5016,17 @@
       </p:cxnSp>
       <p:cxnSp>
         <p:nvCxnSpPr>
-          <p:cNvPr id="50" name="Straight Connector 49"/>
+          <p:cNvPr id="47" name="Straight Connector 46"/>
           <p:cNvCxnSpPr>
-            <a:cxnSpLocks/>
-            <a:stCxn id="46" idx="1"/>
-            <a:endCxn id="152" idx="3"/>
+            <a:stCxn id="30" idx="1"/>
+            <a:endCxn id="5" idx="3"/>
           </p:cNvCxnSpPr>
           <p:nvPr/>
         </p:nvCxnSpPr>
         <p:spPr>
           <a:xfrm flipH="1">
-            <a:off x="6612657" y="2551195"/>
-            <a:ext cx="96038" cy="64933"/>
+            <a:off x="2942637" y="472763"/>
+            <a:ext cx="3599861" cy="35099"/>
           </a:xfrm>
           <a:prstGeom prst="line">
             <a:avLst/>
@@ -4742,7 +5058,7 @@
         </p:nvSpPr>
         <p:spPr>
           <a:xfrm>
-            <a:off x="3423114" y="3271874"/>
+            <a:off x="4485333" y="3271873"/>
             <a:ext cx="890486" cy="245900"/>
           </a:xfrm>
           <a:prstGeom prst="roundRect">
@@ -4796,7 +5112,7 @@
         </p:nvCxnSpPr>
         <p:spPr>
           <a:xfrm flipH="1">
-            <a:off x="3866201" y="3517774"/>
+            <a:off x="4928420" y="3517773"/>
             <a:ext cx="2159" cy="281056"/>
           </a:xfrm>
           <a:prstGeom prst="straightConnector1">
@@ -4833,7 +5149,7 @@
         </p:nvCxnSpPr>
         <p:spPr>
           <a:xfrm flipV="1">
-            <a:off x="3868357" y="3004926"/>
+            <a:off x="4930576" y="3004925"/>
             <a:ext cx="0" cy="266948"/>
           </a:xfrm>
           <a:prstGeom prst="straightConnector1">
@@ -4866,7 +5182,7 @@
         </p:nvSpPr>
         <p:spPr>
           <a:xfrm>
-            <a:off x="2855237" y="3798830"/>
+            <a:off x="3917456" y="3798829"/>
             <a:ext cx="2021927" cy="392734"/>
           </a:xfrm>
           <a:prstGeom prst="rect">
@@ -4907,7 +5223,7 @@
         </p:nvSpPr>
         <p:spPr>
           <a:xfrm>
-            <a:off x="3303248" y="4399693"/>
+            <a:off x="4365467" y="4399692"/>
             <a:ext cx="1125905" cy="245900"/>
           </a:xfrm>
           <a:prstGeom prst="roundRect">
@@ -4956,7 +5272,7 @@
         </p:nvCxnSpPr>
         <p:spPr>
           <a:xfrm flipV="1">
-            <a:off x="3866198" y="4191567"/>
+            <a:off x="4928417" y="4191566"/>
             <a:ext cx="0" cy="208129"/>
           </a:xfrm>
           <a:prstGeom prst="straightConnector1">
@@ -4989,7 +5305,7 @@
         </p:nvSpPr>
         <p:spPr>
           <a:xfrm>
-            <a:off x="2855237" y="4911790"/>
+            <a:off x="3917456" y="4911789"/>
             <a:ext cx="2021927" cy="317507"/>
           </a:xfrm>
           <a:prstGeom prst="rect">
@@ -5033,7 +5349,7 @@
         </p:nvCxnSpPr>
         <p:spPr>
           <a:xfrm>
-            <a:off x="3866198" y="4645593"/>
+            <a:off x="4928417" y="4645592"/>
             <a:ext cx="0" cy="266194"/>
           </a:xfrm>
           <a:prstGeom prst="straightConnector1">
@@ -5067,7 +5383,7 @@
         </p:nvSpPr>
         <p:spPr>
           <a:xfrm>
-            <a:off x="1849551" y="5482001"/>
+            <a:off x="1399849" y="5482001"/>
             <a:ext cx="890486" cy="198798"/>
           </a:xfrm>
           <a:prstGeom prst="roundRect">
@@ -5116,8 +5432,8 @@
         </p:nvCxnSpPr>
         <p:spPr>
           <a:xfrm>
-            <a:off x="2294794" y="5680799"/>
-            <a:ext cx="8414" cy="275344"/>
+            <a:off x="1845092" y="5680799"/>
+            <a:ext cx="8414" cy="301848"/>
           </a:xfrm>
           <a:prstGeom prst="straightConnector1">
             <a:avLst/>
@@ -5148,14 +5464,14 @@
           <p:cNvCxnSpPr>
             <a:cxnSpLocks/>
             <a:stCxn id="77" idx="0"/>
-            <a:endCxn id="149" idx="2"/>
+            <a:endCxn id="71" idx="2"/>
           </p:cNvCxnSpPr>
           <p:nvPr/>
         </p:nvCxnSpPr>
         <p:spPr>
           <a:xfrm flipV="1">
-            <a:off x="2294794" y="5304522"/>
-            <a:ext cx="2427370" cy="177479"/>
+            <a:off x="1845092" y="5229296"/>
+            <a:ext cx="3083328" cy="252705"/>
           </a:xfrm>
           <a:prstGeom prst="straightConnector1">
             <a:avLst/>
@@ -5190,8 +5506,8 @@
         </p:nvCxnSpPr>
         <p:spPr>
           <a:xfrm flipH="1" flipV="1">
-            <a:off x="1283751" y="3004925"/>
-            <a:ext cx="1011043" cy="2477076"/>
+            <a:off x="1843602" y="3004925"/>
+            <a:ext cx="1490" cy="2477076"/>
           </a:xfrm>
           <a:prstGeom prst="straightConnector1">
             <a:avLst/>
@@ -5223,7 +5539,7 @@
         </p:nvGrpSpPr>
         <p:grpSpPr>
           <a:xfrm>
-            <a:off x="1202247" y="5956143"/>
+            <a:off x="752545" y="5982647"/>
             <a:ext cx="2201922" cy="966971"/>
             <a:chOff x="1846232" y="121664"/>
             <a:chExt cx="2201922" cy="966971"/>
@@ -5648,7 +5964,7 @@
         </p:nvSpPr>
         <p:spPr>
           <a:xfrm>
-            <a:off x="1856761" y="7253107"/>
+            <a:off x="1407059" y="7345871"/>
             <a:ext cx="890486" cy="245900"/>
           </a:xfrm>
           <a:prstGeom prst="roundRect">
@@ -5702,7 +6018,7 @@
         </p:nvCxnSpPr>
         <p:spPr>
           <a:xfrm flipH="1">
-            <a:off x="2299848" y="7499010"/>
+            <a:off x="1850146" y="7591774"/>
             <a:ext cx="2159" cy="249037"/>
           </a:xfrm>
           <a:prstGeom prst="straightConnector1">
@@ -5740,8 +6056,8 @@
         </p:nvCxnSpPr>
         <p:spPr>
           <a:xfrm flipV="1">
-            <a:off x="2302004" y="6923114"/>
-            <a:ext cx="1204" cy="329993"/>
+            <a:off x="1852302" y="6949618"/>
+            <a:ext cx="1204" cy="396253"/>
           </a:xfrm>
           <a:prstGeom prst="straightConnector1">
             <a:avLst/>
@@ -5773,7 +6089,7 @@
         </p:nvSpPr>
         <p:spPr>
           <a:xfrm>
-            <a:off x="1288884" y="7748044"/>
+            <a:off x="839182" y="7840808"/>
             <a:ext cx="2021927" cy="392734"/>
           </a:xfrm>
           <a:prstGeom prst="rect">
@@ -5814,7 +6130,7 @@
         </p:nvSpPr>
         <p:spPr>
           <a:xfrm>
-            <a:off x="1729500" y="11094549"/>
+            <a:off x="1279798" y="11184489"/>
             <a:ext cx="1125905" cy="245900"/>
           </a:xfrm>
           <a:prstGeom prst="roundRect">
@@ -5863,8 +6179,8 @@
         </p:nvCxnSpPr>
         <p:spPr>
           <a:xfrm flipH="1">
-            <a:off x="2288589" y="11340449"/>
-            <a:ext cx="3864" cy="386522"/>
+            <a:off x="1838887" y="11430389"/>
+            <a:ext cx="3864" cy="296582"/>
           </a:xfrm>
           <a:prstGeom prst="straightConnector1">
             <a:avLst/>
@@ -5897,7 +6213,7 @@
         </p:nvSpPr>
         <p:spPr>
           <a:xfrm>
-            <a:off x="1277625" y="11726971"/>
+            <a:off x="827923" y="11726971"/>
             <a:ext cx="2021927" cy="392734"/>
           </a:xfrm>
           <a:prstGeom prst="rect">
@@ -5938,8 +6254,8 @@
         </p:nvSpPr>
         <p:spPr>
           <a:xfrm>
-            <a:off x="5388516" y="2230399"/>
-            <a:ext cx="971185" cy="774528"/>
+            <a:off x="6547886" y="2230398"/>
+            <a:ext cx="2021927" cy="774528"/>
           </a:xfrm>
           <a:prstGeom prst="rect">
             <a:avLst/>
@@ -5975,6 +6291,7 @@
         <p:nvCxnSpPr>
           <p:cNvPr id="128" name="Straight Arrow Connector 127"/>
           <p:cNvCxnSpPr>
+            <a:cxnSpLocks/>
             <a:stCxn id="15" idx="2"/>
             <a:endCxn id="124" idx="0"/>
           </p:cNvCxnSpPr>
@@ -5982,8 +6299,8 @@
         </p:nvCxnSpPr>
         <p:spPr>
           <a:xfrm>
-            <a:off x="2549907" y="1525208"/>
-            <a:ext cx="3324202" cy="705191"/>
+            <a:off x="1840918" y="1525208"/>
+            <a:ext cx="5717932" cy="705190"/>
           </a:xfrm>
           <a:prstGeom prst="straightConnector1">
             <a:avLst/>
@@ -6016,7 +6333,7 @@
         </p:nvSpPr>
         <p:spPr>
           <a:xfrm>
-            <a:off x="5121765" y="4911790"/>
+            <a:off x="6813564" y="4911789"/>
             <a:ext cx="1483386" cy="317507"/>
           </a:xfrm>
           <a:prstGeom prst="rect">
@@ -6057,7 +6374,7 @@
         </p:nvSpPr>
         <p:spPr>
           <a:xfrm>
-            <a:off x="6897202" y="6100390"/>
+            <a:off x="4332526" y="5814488"/>
             <a:ext cx="2058290" cy="646331"/>
           </a:xfrm>
           <a:prstGeom prst="rect">
@@ -6095,78 +6412,8 @@
         </p:nvCxnSpPr>
         <p:spPr>
           <a:xfrm flipH="1">
-            <a:off x="3404169" y="6423556"/>
-            <a:ext cx="3493033" cy="16073"/>
-          </a:xfrm>
-          <a:prstGeom prst="line">
-            <a:avLst/>
-          </a:prstGeom>
-          <a:ln>
-            <a:prstDash val="sysDot"/>
-          </a:ln>
-        </p:spPr>
-        <p:style>
-          <a:lnRef idx="2">
-            <a:schemeClr val="accent1"/>
-          </a:lnRef>
-          <a:fillRef idx="0">
-            <a:schemeClr val="accent1"/>
-          </a:fillRef>
-          <a:effectRef idx="1">
-            <a:schemeClr val="accent1"/>
-          </a:effectRef>
-          <a:fontRef idx="minor">
-            <a:schemeClr val="tx1"/>
-          </a:fontRef>
-        </p:style>
-      </p:cxnSp>
-      <p:sp>
-        <p:nvSpPr>
-          <p:cNvPr id="158" name="TextBox 157"/>
-          <p:cNvSpPr txBox="1"/>
-          <p:nvPr/>
-        </p:nvSpPr>
-        <p:spPr>
-          <a:xfrm>
-            <a:off x="6896050" y="3240775"/>
-            <a:ext cx="1989936" cy="276999"/>
-          </a:xfrm>
-          <a:prstGeom prst="rect">
-            <a:avLst/>
-          </a:prstGeom>
-          <a:noFill/>
-          <a:ln>
-            <a:solidFill>
-              <a:schemeClr val="tx2"/>
-            </a:solidFill>
-          </a:ln>
-        </p:spPr>
-        <p:txBody>
-          <a:bodyPr wrap="square" rtlCol="0">
-            <a:spAutoFit/>
-          </a:bodyPr>
-          <a:lstStyle/>
-          <a:p>
-            <a:r>
-              <a:rPr lang="en-US" sz="1200" dirty="0"/>
-              <a:t>See “Engine”</a:t>
-            </a:r>
-          </a:p>
-        </p:txBody>
-      </p:sp>
-      <p:cxnSp>
-        <p:nvCxnSpPr>
-          <p:cNvPr id="160" name="Straight Connector 159"/>
-          <p:cNvCxnSpPr>
-            <a:stCxn id="158" idx="1"/>
-            <a:endCxn id="53" idx="3"/>
-          </p:cNvCxnSpPr>
-          <p:nvPr/>
-        </p:nvCxnSpPr>
-        <p:spPr>
-          <a:xfrm flipH="1">
-            <a:off x="4313600" y="3379275"/>
-            <a:ext cx="2582450" cy="15549"/>
+            <a:off x="2954467" y="6137654"/>
+            <a:ext cx="1378059" cy="328479"/>
           </a:xfrm>
           <a:prstGeom prst="line">
             <a:avLst/>
@@ -6198,7 +6445,7 @@
         </p:nvGrpSpPr>
         <p:grpSpPr>
           <a:xfrm>
-            <a:off x="4078624" y="7701386"/>
+            <a:off x="5689283" y="7833738"/>
             <a:ext cx="1044719" cy="657775"/>
             <a:chOff x="3683036" y="4436545"/>
             <a:chExt cx="1485930" cy="905922"/>
@@ -6535,7 +6782,7 @@
         </p:nvSpPr>
         <p:spPr>
           <a:xfrm>
-            <a:off x="4020032" y="7197845"/>
+            <a:off x="5630691" y="7330197"/>
             <a:ext cx="1125905" cy="301162"/>
           </a:xfrm>
           <a:prstGeom prst="roundRect">
@@ -6584,8 +6831,8 @@
         </p:nvCxnSpPr>
         <p:spPr>
           <a:xfrm flipH="1" flipV="1">
-            <a:off x="2303208" y="6923114"/>
-            <a:ext cx="2279777" cy="274731"/>
+            <a:off x="1853506" y="6949618"/>
+            <a:ext cx="4340138" cy="380579"/>
           </a:xfrm>
           <a:prstGeom prst="straightConnector1">
             <a:avLst/>
@@ -6620,7 +6867,7 @@
         </p:nvCxnSpPr>
         <p:spPr>
           <a:xfrm>
-            <a:off x="4582985" y="7499007"/>
+            <a:off x="6193644" y="7631359"/>
             <a:ext cx="17999" cy="202376"/>
           </a:xfrm>
           <a:prstGeom prst="straightConnector1">
@@ -6654,7 +6901,7 @@
         </p:nvSpPr>
         <p:spPr>
           <a:xfrm>
-            <a:off x="3234776" y="8574987"/>
+            <a:off x="5648690" y="8718954"/>
             <a:ext cx="1125905" cy="301162"/>
           </a:xfrm>
           <a:prstGeom prst="roundRect">
@@ -6696,6 +6943,7 @@
         <p:nvCxnSpPr>
           <p:cNvPr id="186" name="Straight Arrow Connector 185"/>
           <p:cNvCxnSpPr>
+            <a:cxnSpLocks/>
             <a:stCxn id="185" idx="0"/>
             <a:endCxn id="167" idx="2"/>
           </p:cNvCxnSpPr>
@@ -6703,8 +6951,8 @@
         </p:nvCxnSpPr>
         <p:spPr>
           <a:xfrm flipV="1">
-            <a:off x="3797729" y="8359161"/>
-            <a:ext cx="803255" cy="215826"/>
+            <a:off x="6211643" y="8491513"/>
+            <a:ext cx="0" cy="227441"/>
           </a:xfrm>
           <a:prstGeom prst="straightConnector1">
             <a:avLst/>
@@ -6736,7 +6984,7 @@
         </p:nvSpPr>
         <p:spPr>
           <a:xfrm>
-            <a:off x="2787133" y="9081626"/>
+            <a:off x="5201047" y="9225593"/>
             <a:ext cx="2021927" cy="392734"/>
           </a:xfrm>
           <a:prstGeom prst="rect">
@@ -6780,7 +7028,7 @@
         </p:nvCxnSpPr>
         <p:spPr>
           <a:xfrm>
-            <a:off x="3797729" y="8876149"/>
+            <a:off x="6211643" y="9020116"/>
             <a:ext cx="368" cy="205477"/>
           </a:xfrm>
           <a:prstGeom prst="straightConnector1">
@@ -6814,7 +7062,7 @@
         </p:nvSpPr>
         <p:spPr>
           <a:xfrm>
-            <a:off x="1288884" y="10442717"/>
+            <a:off x="839182" y="10532657"/>
             <a:ext cx="2021927" cy="392734"/>
           </a:xfrm>
           <a:prstGeom prst="rect">
@@ -6855,7 +7103,7 @@
         </p:nvSpPr>
         <p:spPr>
           <a:xfrm>
-            <a:off x="1847210" y="9859828"/>
+            <a:off x="1397508" y="9949768"/>
             <a:ext cx="890486" cy="301162"/>
           </a:xfrm>
           <a:prstGeom prst="roundRect">
@@ -6905,8 +7153,8 @@
         </p:nvCxnSpPr>
         <p:spPr>
           <a:xfrm flipV="1">
-            <a:off x="2292453" y="9474360"/>
-            <a:ext cx="1505644" cy="385468"/>
+            <a:off x="1842751" y="9618327"/>
+            <a:ext cx="4369260" cy="331441"/>
           </a:xfrm>
           <a:prstGeom prst="straightConnector1">
             <a:avLst/>
@@ -6942,8 +7190,8 @@
         </p:nvCxnSpPr>
         <p:spPr>
           <a:xfrm flipV="1">
-            <a:off x="2292453" y="8140778"/>
-            <a:ext cx="7395" cy="1719050"/>
+            <a:off x="1842751" y="8233542"/>
+            <a:ext cx="7395" cy="1716226"/>
           </a:xfrm>
           <a:prstGeom prst="straightConnector1">
             <a:avLst/>
@@ -6978,7 +7226,7 @@
         </p:nvCxnSpPr>
         <p:spPr>
           <a:xfrm flipV="1">
-            <a:off x="2292453" y="10835451"/>
+            <a:off x="1842751" y="10925391"/>
             <a:ext cx="7395" cy="259098"/>
           </a:xfrm>
           <a:prstGeom prst="straightConnector1">
@@ -7014,7 +7262,7 @@
         </p:nvCxnSpPr>
         <p:spPr>
           <a:xfrm rot="16200000" flipH="1">
-            <a:off x="2155287" y="10298155"/>
+            <a:off x="1705585" y="10388095"/>
             <a:ext cx="281727" cy="7395"/>
           </a:xfrm>
           <a:prstGeom prst="bentConnector3">
@@ -7025,6 +7273,543 @@
           <a:ln>
             <a:prstDash val="sysDash"/>
             <a:tailEnd type="arrow"/>
+          </a:ln>
+        </p:spPr>
+        <p:style>
+          <a:lnRef idx="2">
+            <a:schemeClr val="accent1"/>
+          </a:lnRef>
+          <a:fillRef idx="0">
+            <a:schemeClr val="accent1"/>
+          </a:fillRef>
+          <a:effectRef idx="1">
+            <a:schemeClr val="accent1"/>
+          </a:effectRef>
+          <a:fontRef idx="minor">
+            <a:schemeClr val="tx1"/>
+          </a:fontRef>
+        </p:style>
+      </p:cxnSp>
+      <p:sp>
+        <p:nvSpPr>
+          <p:cNvPr id="109" name="Rectangle 108">
+            <a:extLst>
+              <a:ext uri="{FF2B5EF4-FFF2-40B4-BE49-F238E27FC236}">
+                <a16:creationId xmlns:a16="http://schemas.microsoft.com/office/drawing/2014/main" id="{6BF78F6F-3C47-7A43-8D78-BAE9A2A02F9B}"/>
+              </a:ext>
+            </a:extLst>
+          </p:cNvPr>
+          <p:cNvSpPr/>
+          <p:nvPr/>
+        </p:nvSpPr>
+        <p:spPr>
+          <a:xfrm>
+            <a:off x="3575125" y="1152739"/>
+            <a:ext cx="2568384" cy="4348687"/>
+          </a:xfrm>
+          <a:prstGeom prst="rect">
+            <a:avLst/>
+          </a:prstGeom>
+          <a:noFill/>
+        </p:spPr>
+        <p:style>
+          <a:lnRef idx="1">
+            <a:schemeClr val="accent1"/>
+          </a:lnRef>
+          <a:fillRef idx="3">
+            <a:schemeClr val="accent1"/>
+          </a:fillRef>
+          <a:effectRef idx="2">
+            <a:schemeClr val="accent1"/>
+          </a:effectRef>
+          <a:fontRef idx="minor">
+            <a:schemeClr val="lt1"/>
+          </a:fontRef>
+        </p:style>
+        <p:txBody>
+          <a:bodyPr lIns="0" tIns="0" rIns="0" bIns="0" rtlCol="0" anchor="t" anchorCtr="0"/>
+          <a:lstStyle/>
+          <a:p>
+            <a:pPr algn="ctr"/>
+            <a:r>
+              <a:rPr lang="en-US" sz="1600" dirty="0">
+                <a:solidFill>
+                  <a:schemeClr val="tx1"/>
+                </a:solidFill>
+                <a:effectLst>
+                  <a:outerShdw sx="1000" sy="1000" algn="ctr" rotWithShape="0">
+                    <a:schemeClr val="bg1"/>
+                  </a:outerShdw>
+                </a:effectLst>
+              </a:rPr>
+              <a:t>Non-Simple-Parameter-Constraint Handling Branch</a:t>
+            </a:r>
+          </a:p>
+        </p:txBody>
+      </p:sp>
+      <p:sp>
+        <p:nvSpPr>
+          <p:cNvPr id="110" name="Rectangle 109">
+            <a:extLst>
+              <a:ext uri="{FF2B5EF4-FFF2-40B4-BE49-F238E27FC236}">
+                <a16:creationId xmlns:a16="http://schemas.microsoft.com/office/drawing/2014/main" id="{EEFFFC57-A0A7-AD42-8EBD-9B2D1FABDC58}"/>
+              </a:ext>
+            </a:extLst>
+          </p:cNvPr>
+          <p:cNvSpPr/>
+          <p:nvPr/>
+        </p:nvSpPr>
+        <p:spPr>
+          <a:xfrm>
+            <a:off x="4434651" y="6866786"/>
+            <a:ext cx="3485638" cy="3104110"/>
+          </a:xfrm>
+          <a:prstGeom prst="rect">
+            <a:avLst/>
+          </a:prstGeom>
+          <a:noFill/>
+        </p:spPr>
+        <p:style>
+          <a:lnRef idx="1">
+            <a:schemeClr val="accent1"/>
+          </a:lnRef>
+          <a:fillRef idx="3">
+            <a:schemeClr val="accent1"/>
+          </a:fillRef>
+          <a:effectRef idx="2">
+            <a:schemeClr val="accent1"/>
+          </a:effectRef>
+          <a:fontRef idx="minor">
+            <a:schemeClr val="lt1"/>
+          </a:fontRef>
+        </p:style>
+        <p:txBody>
+          <a:bodyPr lIns="0" tIns="0" rIns="0" bIns="0" rtlCol="0" anchor="t" anchorCtr="0"/>
+          <a:lstStyle/>
+          <a:p>
+            <a:pPr algn="ctr"/>
+            <a:r>
+              <a:rPr lang="en-US" sz="1600" dirty="0">
+                <a:solidFill>
+                  <a:schemeClr val="tx1"/>
+                </a:solidFill>
+              </a:rPr>
+              <a:t>Negative Test Generation Branch</a:t>
+            </a:r>
+          </a:p>
+        </p:txBody>
+      </p:sp>
+      <p:sp>
+        <p:nvSpPr>
+          <p:cNvPr id="112" name="Rectangle 111">
+            <a:extLst>
+              <a:ext uri="{FF2B5EF4-FFF2-40B4-BE49-F238E27FC236}">
+                <a16:creationId xmlns:a16="http://schemas.microsoft.com/office/drawing/2014/main" id="{3BF2503B-3B8F-9744-A6B2-35275DFAEF7B}"/>
+              </a:ext>
+            </a:extLst>
+          </p:cNvPr>
+          <p:cNvSpPr/>
+          <p:nvPr/>
+        </p:nvSpPr>
+        <p:spPr>
+          <a:xfrm>
+            <a:off x="6215883" y="1155239"/>
+            <a:ext cx="2568384" cy="4348687"/>
+          </a:xfrm>
+          <a:prstGeom prst="rect">
+            <a:avLst/>
+          </a:prstGeom>
+          <a:noFill/>
+        </p:spPr>
+        <p:style>
+          <a:lnRef idx="1">
+            <a:schemeClr val="accent1"/>
+          </a:lnRef>
+          <a:fillRef idx="3">
+            <a:schemeClr val="accent1"/>
+          </a:fillRef>
+          <a:effectRef idx="2">
+            <a:schemeClr val="accent1"/>
+          </a:effectRef>
+          <a:fontRef idx="minor">
+            <a:schemeClr val="lt1"/>
+          </a:fontRef>
+        </p:style>
+        <p:txBody>
+          <a:bodyPr lIns="0" tIns="0" rIns="0" bIns="0" rtlCol="0" anchor="t" anchorCtr="0"/>
+          <a:lstStyle/>
+          <a:p>
+            <a:pPr algn="ctr"/>
+            <a:r>
+              <a:rPr lang="en-US" sz="1600" dirty="0">
+                <a:solidFill>
+                  <a:schemeClr val="tx1"/>
+                </a:solidFill>
+                <a:effectLst>
+                  <a:outerShdw sx="1000" sy="1000" algn="ctr" rotWithShape="0">
+                    <a:schemeClr val="bg1"/>
+                  </a:outerShdw>
+                </a:effectLst>
+              </a:rPr>
+              <a:t>Non-Simple-Parameter-Constraint Handling Branch</a:t>
+            </a:r>
+          </a:p>
+        </p:txBody>
+      </p:sp>
+      <p:sp>
+        <p:nvSpPr>
+          <p:cNvPr id="114" name="Rounded Rectangle 113">
+            <a:extLst>
+              <a:ext uri="{FF2B5EF4-FFF2-40B4-BE49-F238E27FC236}">
+                <a16:creationId xmlns:a16="http://schemas.microsoft.com/office/drawing/2014/main" id="{F00D8164-BF23-F843-A5D7-8B2A16A25BE0}"/>
+              </a:ext>
+            </a:extLst>
+          </p:cNvPr>
+          <p:cNvSpPr/>
+          <p:nvPr/>
+        </p:nvSpPr>
+        <p:spPr>
+          <a:xfrm>
+            <a:off x="7115763" y="3271873"/>
+            <a:ext cx="890486" cy="245900"/>
+          </a:xfrm>
+          <a:prstGeom prst="roundRect">
+            <a:avLst/>
+          </a:prstGeom>
+          <a:solidFill>
+            <a:schemeClr val="accent2"/>
+          </a:solidFill>
+          <a:ln>
+            <a:solidFill>
+              <a:schemeClr val="accent2">
+                <a:lumMod val="50000"/>
+              </a:schemeClr>
+            </a:solidFill>
+          </a:ln>
+        </p:spPr>
+        <p:style>
+          <a:lnRef idx="1">
+            <a:schemeClr val="accent1"/>
+          </a:lnRef>
+          <a:fillRef idx="3">
+            <a:schemeClr val="accent1"/>
+          </a:fillRef>
+          <a:effectRef idx="2">
+            <a:schemeClr val="accent1"/>
+          </a:effectRef>
+          <a:fontRef idx="minor">
+            <a:schemeClr val="lt1"/>
+          </a:fontRef>
+        </p:style>
+        <p:txBody>
+          <a:bodyPr rtlCol="0" anchor="ctr"/>
+          <a:lstStyle/>
+          <a:p>
+            <a:pPr algn="ctr"/>
+            <a:r>
+              <a:rPr lang="en-US" sz="1200" dirty="0"/>
+              <a:t>Engine</a:t>
+            </a:r>
+          </a:p>
+        </p:txBody>
+      </p:sp>
+      <p:cxnSp>
+        <p:nvCxnSpPr>
+          <p:cNvPr id="116" name="Straight Arrow Connector 115">
+            <a:extLst>
+              <a:ext uri="{FF2B5EF4-FFF2-40B4-BE49-F238E27FC236}">
+                <a16:creationId xmlns:a16="http://schemas.microsoft.com/office/drawing/2014/main" id="{CE5710E9-4B24-8241-B491-DD598D4D4F37}"/>
+              </a:ext>
+            </a:extLst>
+          </p:cNvPr>
+          <p:cNvCxnSpPr>
+            <a:stCxn id="114" idx="2"/>
+            <a:endCxn id="118" idx="0"/>
+          </p:cNvCxnSpPr>
+          <p:nvPr/>
+        </p:nvCxnSpPr>
+        <p:spPr>
+          <a:xfrm flipH="1">
+            <a:off x="7558850" y="3517773"/>
+            <a:ext cx="2159" cy="281056"/>
+          </a:xfrm>
+          <a:prstGeom prst="straightConnector1">
+            <a:avLst/>
+          </a:prstGeom>
+          <a:ln>
+            <a:prstDash val="sysDash"/>
+            <a:tailEnd type="arrow"/>
+          </a:ln>
+        </p:spPr>
+        <p:style>
+          <a:lnRef idx="2">
+            <a:schemeClr val="accent1"/>
+          </a:lnRef>
+          <a:fillRef idx="0">
+            <a:schemeClr val="accent1"/>
+          </a:fillRef>
+          <a:effectRef idx="1">
+            <a:schemeClr val="accent1"/>
+          </a:effectRef>
+          <a:fontRef idx="minor">
+            <a:schemeClr val="tx1"/>
+          </a:fontRef>
+        </p:style>
+      </p:cxnSp>
+      <p:cxnSp>
+        <p:nvCxnSpPr>
+          <p:cNvPr id="117" name="Straight Arrow Connector 116">
+            <a:extLst>
+              <a:ext uri="{FF2B5EF4-FFF2-40B4-BE49-F238E27FC236}">
+                <a16:creationId xmlns:a16="http://schemas.microsoft.com/office/drawing/2014/main" id="{2BCEF608-A81F-7147-8ABF-3F18E0FB9814}"/>
+              </a:ext>
+            </a:extLst>
+          </p:cNvPr>
+          <p:cNvCxnSpPr>
+            <a:cxnSpLocks/>
+            <a:stCxn id="114" idx="0"/>
+            <a:endCxn id="124" idx="2"/>
+          </p:cNvCxnSpPr>
+          <p:nvPr/>
+        </p:nvCxnSpPr>
+        <p:spPr>
+          <a:xfrm flipH="1" flipV="1">
+            <a:off x="7558850" y="3004926"/>
+            <a:ext cx="2156" cy="266947"/>
+          </a:xfrm>
+          <a:prstGeom prst="straightConnector1">
+            <a:avLst/>
+          </a:prstGeom>
+          <a:ln>
+            <a:tailEnd type="triangle"/>
+          </a:ln>
+        </p:spPr>
+        <p:style>
+          <a:lnRef idx="2">
+            <a:schemeClr val="accent1"/>
+          </a:lnRef>
+          <a:fillRef idx="0">
+            <a:schemeClr val="accent1"/>
+          </a:fillRef>
+          <a:effectRef idx="1">
+            <a:schemeClr val="accent1"/>
+          </a:effectRef>
+          <a:fontRef idx="minor">
+            <a:schemeClr val="tx1"/>
+          </a:fontRef>
+        </p:style>
+      </p:cxnSp>
+      <p:sp>
+        <p:nvSpPr>
+          <p:cNvPr id="118" name="Rectangle 117">
+            <a:extLst>
+              <a:ext uri="{FF2B5EF4-FFF2-40B4-BE49-F238E27FC236}">
+                <a16:creationId xmlns:a16="http://schemas.microsoft.com/office/drawing/2014/main" id="{D5F67892-86F4-3D4E-BF41-D6C528E1597F}"/>
+              </a:ext>
+            </a:extLst>
+          </p:cNvPr>
+          <p:cNvSpPr/>
+          <p:nvPr/>
+        </p:nvSpPr>
+        <p:spPr>
+          <a:xfrm>
+            <a:off x="6547886" y="3798829"/>
+            <a:ext cx="2021927" cy="392734"/>
+          </a:xfrm>
+          <a:prstGeom prst="rect">
+            <a:avLst/>
+          </a:prstGeom>
+        </p:spPr>
+        <p:style>
+          <a:lnRef idx="1">
+            <a:schemeClr val="accent1"/>
+          </a:lnRef>
+          <a:fillRef idx="3">
+            <a:schemeClr val="accent1"/>
+          </a:fillRef>
+          <a:effectRef idx="2">
+            <a:schemeClr val="accent1"/>
+          </a:effectRef>
+          <a:fontRef idx="minor">
+            <a:schemeClr val="lt1"/>
+          </a:fontRef>
+        </p:style>
+        <p:txBody>
+          <a:bodyPr rtlCol="0" anchor="t" anchorCtr="0"/>
+          <a:lstStyle/>
+          <a:p>
+            <a:pPr algn="ctr"/>
+            <a:r>
+              <a:rPr lang="en-US" sz="1200" dirty="0"/>
+              <a:t>Decoded Covering Array</a:t>
+            </a:r>
+          </a:p>
+        </p:txBody>
+      </p:sp>
+      <p:sp>
+        <p:nvSpPr>
+          <p:cNvPr id="119" name="Rounded Rectangle 118">
+            <a:extLst>
+              <a:ext uri="{FF2B5EF4-FFF2-40B4-BE49-F238E27FC236}">
+                <a16:creationId xmlns:a16="http://schemas.microsoft.com/office/drawing/2014/main" id="{82354CB9-D146-FD46-B8C2-C212B1FDC713}"/>
+              </a:ext>
+            </a:extLst>
+          </p:cNvPr>
+          <p:cNvSpPr/>
+          <p:nvPr/>
+        </p:nvSpPr>
+        <p:spPr>
+          <a:xfrm>
+            <a:off x="6995897" y="4399692"/>
+            <a:ext cx="1125905" cy="245900"/>
+          </a:xfrm>
+          <a:prstGeom prst="roundRect">
+            <a:avLst/>
+          </a:prstGeom>
+          <a:noFill/>
+        </p:spPr>
+        <p:style>
+          <a:lnRef idx="1">
+            <a:schemeClr val="accent1"/>
+          </a:lnRef>
+          <a:fillRef idx="3">
+            <a:schemeClr val="accent1"/>
+          </a:fillRef>
+          <a:effectRef idx="2">
+            <a:schemeClr val="accent1"/>
+          </a:effectRef>
+          <a:fontRef idx="minor">
+            <a:schemeClr val="lt1"/>
+          </a:fontRef>
+        </p:style>
+        <p:txBody>
+          <a:bodyPr rtlCol="0" anchor="ctr"/>
+          <a:lstStyle/>
+          <a:p>
+            <a:pPr algn="ctr"/>
+            <a:r>
+              <a:rPr lang="en-US" sz="1200" dirty="0">
+                <a:solidFill>
+                  <a:schemeClr val="tx1"/>
+                </a:solidFill>
+              </a:rPr>
+              <a:t>Extract</a:t>
+            </a:r>
+          </a:p>
+        </p:txBody>
+      </p:sp>
+      <p:cxnSp>
+        <p:nvCxnSpPr>
+          <p:cNvPr id="121" name="Straight Arrow Connector 120">
+            <a:extLst>
+              <a:ext uri="{FF2B5EF4-FFF2-40B4-BE49-F238E27FC236}">
+                <a16:creationId xmlns:a16="http://schemas.microsoft.com/office/drawing/2014/main" id="{E4BA551B-E4FD-ED4C-81A3-8A18CBC72D45}"/>
+              </a:ext>
+            </a:extLst>
+          </p:cNvPr>
+          <p:cNvCxnSpPr>
+            <a:stCxn id="119" idx="0"/>
+            <a:endCxn id="118" idx="2"/>
+          </p:cNvCxnSpPr>
+          <p:nvPr/>
+        </p:nvCxnSpPr>
+        <p:spPr>
+          <a:xfrm flipV="1">
+            <a:off x="7558847" y="4191566"/>
+            <a:ext cx="0" cy="208129"/>
+          </a:xfrm>
+          <a:prstGeom prst="straightConnector1">
+            <a:avLst/>
+          </a:prstGeom>
+          <a:ln>
+            <a:tailEnd type="triangle"/>
+          </a:ln>
+        </p:spPr>
+        <p:style>
+          <a:lnRef idx="2">
+            <a:schemeClr val="accent1"/>
+          </a:lnRef>
+          <a:fillRef idx="0">
+            <a:schemeClr val="accent1"/>
+          </a:fillRef>
+          <a:effectRef idx="1">
+            <a:schemeClr val="accent1"/>
+          </a:effectRef>
+          <a:fontRef idx="minor">
+            <a:schemeClr val="tx1"/>
+          </a:fontRef>
+        </p:style>
+      </p:cxnSp>
+      <p:cxnSp>
+        <p:nvCxnSpPr>
+          <p:cNvPr id="122" name="Straight Arrow Connector 121">
+            <a:extLst>
+              <a:ext uri="{FF2B5EF4-FFF2-40B4-BE49-F238E27FC236}">
+                <a16:creationId xmlns:a16="http://schemas.microsoft.com/office/drawing/2014/main" id="{83397BFD-1E1E-614B-B49C-D590F47A31FF}"/>
+              </a:ext>
+            </a:extLst>
+          </p:cNvPr>
+          <p:cNvCxnSpPr>
+            <a:cxnSpLocks/>
+            <a:stCxn id="119" idx="2"/>
+            <a:endCxn id="136" idx="0"/>
+          </p:cNvCxnSpPr>
+          <p:nvPr/>
+        </p:nvCxnSpPr>
+        <p:spPr>
+          <a:xfrm flipH="1">
+            <a:off x="7555257" y="4645592"/>
+            <a:ext cx="3593" cy="266197"/>
+          </a:xfrm>
+          <a:prstGeom prst="straightConnector1">
+            <a:avLst/>
+          </a:prstGeom>
+          <a:ln>
+            <a:prstDash val="sysDash"/>
+            <a:tailEnd type="arrow"/>
+          </a:ln>
+        </p:spPr>
+        <p:style>
+          <a:lnRef idx="2">
+            <a:schemeClr val="accent1"/>
+          </a:lnRef>
+          <a:fillRef idx="0">
+            <a:schemeClr val="accent1"/>
+          </a:fillRef>
+          <a:effectRef idx="1">
+            <a:schemeClr val="accent1"/>
+          </a:effectRef>
+          <a:fontRef idx="minor">
+            <a:schemeClr val="tx1"/>
+          </a:fontRef>
+        </p:style>
+      </p:cxnSp>
+      <p:cxnSp>
+        <p:nvCxnSpPr>
+          <p:cNvPr id="123" name="Straight Arrow Connector 122">
+            <a:extLst>
+              <a:ext uri="{FF2B5EF4-FFF2-40B4-BE49-F238E27FC236}">
+                <a16:creationId xmlns:a16="http://schemas.microsoft.com/office/drawing/2014/main" id="{536B5860-9C27-0748-9635-853D19ECDABB}"/>
+              </a:ext>
+            </a:extLst>
+          </p:cNvPr>
+          <p:cNvCxnSpPr>
+            <a:cxnSpLocks/>
+            <a:stCxn id="77" idx="0"/>
+            <a:endCxn id="136" idx="2"/>
+          </p:cNvCxnSpPr>
+          <p:nvPr/>
+        </p:nvCxnSpPr>
+        <p:spPr>
+          <a:xfrm flipV="1">
+            <a:off x="1845092" y="5229296"/>
+            <a:ext cx="5710165" cy="252705"/>
+          </a:xfrm>
+          <a:prstGeom prst="straightConnector1">
+            <a:avLst/>
+          </a:prstGeom>
+          <a:ln>
+            <a:tailEnd type="triangle"/>
           </a:ln>
         </p:spPr>
         <p:style>
@@ -10716,4 +11501,299 @@
   <a:objectDefaults/>
   <a:extraClrSchemeLst/>
 </a:theme>
+</file>
+
+<file path=ppt/theme/theme2.xml><?xml version="1.0" encoding="utf-8"?>
+<a:theme xmlns:a="http://schemas.openxmlformats.org/drawingml/2006/main" name="Office Theme">
+  <a:themeElements>
+    <a:clrScheme name="Office">
+      <a:dk1>
+        <a:sysClr val="windowText" lastClr="000000"/>
+      </a:dk1>
+      <a:lt1>
+        <a:sysClr val="window" lastClr="FFFFFF"/>
+      </a:lt1>
+      <a:dk2>
+        <a:srgbClr val="44546A"/>
+      </a:dk2>
+      <a:lt2>
+        <a:srgbClr val="E7E6E6"/>
+      </a:lt2>
+      <a:accent1>
+        <a:srgbClr val="4472C4"/>
+      </a:accent1>
+      <a:accent2>
+        <a:srgbClr val="ED7D31"/>
+      </a:accent2>
+      <a:accent3>
+        <a:srgbClr val="A5A5A5"/>
+      </a:accent3>
+      <a:accent4>
+        <a:srgbClr val="FFC000"/>
+      </a:accent4>
+      <a:accent5>
+        <a:srgbClr val="5B9BD5"/>
+      </a:accent5>
+      <a:accent6>
+        <a:srgbClr val="70AD47"/>
+      </a:accent6>
+      <a:hlink>
+        <a:srgbClr val="0563C1"/>
+      </a:hlink>
+      <a:folHlink>
+        <a:srgbClr val="954F72"/>
+      </a:folHlink>
+    </a:clrScheme>
+    <a:fontScheme name="Office">
+      <a:majorFont>
+        <a:latin typeface="Calibri Light" panose="020F0302020204030204"/>
+        <a:ea typeface=""/>
+        <a:cs typeface=""/>
+        <a:font script="Jpan" typeface="游ゴシック Light"/>
+        <a:font script="Hang" typeface="맑은 고딕"/>
+        <a:font script="Hans" typeface="等线 Light"/>
+        <a:font script="Hant" typeface="新細明體"/>
+        <a:font script="Arab" typeface="Times New Roman"/>
+        <a:font script="Hebr" typeface="Times New Roman"/>
+        <a:font script="Thai" typeface="Angsana New"/>
+        <a:font script="Ethi" typeface="Nyala"/>
+        <a:font script="Beng" typeface="Vrinda"/>
+        <a:font script="Gujr" typeface="Shruti"/>
+        <a:font script="Khmr" typeface="MoolBoran"/>
+        <a:font script="Knda" typeface="Tunga"/>
+        <a:font script="Guru" typeface="Raavi"/>
+        <a:font script="Cans" typeface="Euphemia"/>
+        <a:font script="Cher" typeface="Plantagenet Cherokee"/>
+        <a:font script="Yiii" typeface="Microsoft Yi Baiti"/>
+        <a:font script="Tibt" typeface="Microsoft Himalaya"/>
+        <a:font script="Thaa" typeface="MV Boli"/>
+        <a:font script="Deva" typeface="Mangal"/>
+        <a:font script="Telu" typeface="Gautami"/>
+        <a:font script="Taml" typeface="Latha"/>
+        <a:font script="Syrc" typeface="Estrangelo Edessa"/>
+        <a:font script="Orya" typeface="Kalinga"/>
+        <a:font script="Mlym" typeface="Kartika"/>
+        <a:font script="Laoo" typeface="DokChampa"/>
+        <a:font script="Sinh" typeface="Iskoola Pota"/>
+        <a:font script="Mong" typeface="Mongolian Baiti"/>
+        <a:font script="Viet" typeface="Times New Roman"/>
+        <a:font script="Uigh" typeface="Microsoft Uighur"/>
+        <a:font script="Geor" typeface="Sylfaen"/>
+        <a:font script="Armn" typeface="Arial"/>
+        <a:font script="Bugi" typeface="Leelawadee UI"/>
+        <a:font script="Bopo" typeface="Microsoft JhengHei"/>
+        <a:font script="Java" typeface="Javanese Text"/>
+        <a:font script="Lisu" typeface="Segoe UI"/>
+        <a:font script="Mymr" typeface="Myanmar Text"/>
+        <a:font script="Nkoo" typeface="Ebrima"/>
+        <a:font script="Olck" typeface="Nirmala UI"/>
+        <a:font script="Osma" typeface="Ebrima"/>
+        <a:font script="Phag" typeface="Phagspa"/>
+        <a:font script="Syrn" typeface="Estrangelo Edessa"/>
+        <a:font script="Syrj" typeface="Estrangelo Edessa"/>
+        <a:font script="Syre" typeface="Estrangelo Edessa"/>
+        <a:font script="Sora" typeface="Nirmala UI"/>
+        <a:font script="Tale" typeface="Microsoft Tai Le"/>
+        <a:font script="Talu" typeface="Microsoft New Tai Lue"/>
+        <a:font script="Tfng" typeface="Ebrima"/>
+      </a:majorFont>
+      <a:minorFont>
+        <a:latin typeface="Calibri" panose="020F0502020204030204"/>
+        <a:ea typeface=""/>
+        <a:cs typeface=""/>
+        <a:font script="Jpan" typeface="游ゴシック"/>
+        <a:font script="Hang" typeface="맑은 고딕"/>
+        <a:font script="Hans" typeface="等线"/>
+        <a:font script="Hant" typeface="新細明體"/>
+        <a:font script="Arab" typeface="Arial"/>
+        <a:font script="Hebr" typeface="Arial"/>
+        <a:font script="Thai" typeface="Cordia New"/>
+        <a:font script="Ethi" typeface="Nyala"/>
+        <a:font script="Beng" typeface="Vrinda"/>
+        <a:font script="Gujr" typeface="Shruti"/>
+        <a:font script="Khmr" typeface="DaunPenh"/>
+        <a:font script="Knda" typeface="Tunga"/>
+        <a:font script="Guru" typeface="Raavi"/>
+        <a:font script="Cans" typeface="Euphemia"/>
+        <a:font script="Cher" typeface="Plantagenet Cherokee"/>
+        <a:font script="Yiii" typeface="Microsoft Yi Baiti"/>
+        <a:font script="Tibt" typeface="Microsoft Himalaya"/>
+        <a:font script="Thaa" typeface="MV Boli"/>
+        <a:font script="Deva" typeface="Mangal"/>
+        <a:font script="Telu" typeface="Gautami"/>
+        <a:font script="Taml" typeface="Latha"/>
+        <a:font script="Syrc" typeface="Estrangelo Edessa"/>
+        <a:font script="Orya" typeface="Kalinga"/>
+        <a:font script="Mlym" typeface="Kartika"/>
+        <a:font script="Laoo" typeface="DokChampa"/>
+        <a:font script="Sinh" typeface="Iskoola Pota"/>
+        <a:font script="Mong" typeface="Mongolian Baiti"/>
+        <a:font script="Viet" typeface="Arial"/>
+        <a:font script="Uigh" typeface="Microsoft Uighur"/>
+        <a:font script="Geor" typeface="Sylfaen"/>
+        <a:font script="Armn" typeface="Arial"/>
+        <a:font script="Bugi" typeface="Leelawadee UI"/>
+        <a:font script="Bopo" typeface="Microsoft JhengHei"/>
+        <a:font script="Java" typeface="Javanese Text"/>
+        <a:font script="Lisu" typeface="Segoe UI"/>
+        <a:font script="Mymr" typeface="Myanmar Text"/>
+        <a:font script="Nkoo" typeface="Ebrima"/>
+        <a:font script="Olck" typeface="Nirmala UI"/>
+        <a:font script="Osma" typeface="Ebrima"/>
+        <a:font script="Phag" typeface="Phagspa"/>
+        <a:font script="Syrn" typeface="Estrangelo Edessa"/>
+        <a:font script="Syrj" typeface="Estrangelo Edessa"/>
+        <a:font script="Syre" typeface="Estrangelo Edessa"/>
+        <a:font script="Sora" typeface="Nirmala UI"/>
+        <a:font script="Tale" typeface="Microsoft Tai Le"/>
+        <a:font script="Talu" typeface="Microsoft New Tai Lue"/>
+        <a:font script="Tfng" typeface="Ebrima"/>
+      </a:minorFont>
+    </a:fontScheme>
+    <a:fmtScheme name="Office">
+      <a:fillStyleLst>
+        <a:solidFill>
+          <a:schemeClr val="phClr"/>
+        </a:solidFill>
+        <a:gradFill rotWithShape="1">
+          <a:gsLst>
+            <a:gs pos="0">
+              <a:schemeClr val="phClr">
+                <a:lumMod val="110000"/>
+                <a:satMod val="105000"/>
+                <a:tint val="67000"/>
+              </a:schemeClr>
+            </a:gs>
+            <a:gs pos="50000">
+              <a:schemeClr val="phClr">
+                <a:lumMod val="105000"/>
+                <a:satMod val="103000"/>
+                <a:tint val="73000"/>
+              </a:schemeClr>
+            </a:gs>
+            <a:gs pos="100000">
+              <a:schemeClr val="phClr">
+                <a:lumMod val="105000"/>
+                <a:satMod val="109000"/>
+                <a:tint val="81000"/>
+              </a:schemeClr>
+            </a:gs>
+          </a:gsLst>
+          <a:lin ang="5400000" scaled="0"/>
+        </a:gradFill>
+        <a:gradFill rotWithShape="1">
+          <a:gsLst>
+            <a:gs pos="0">
+              <a:schemeClr val="phClr">
+                <a:satMod val="103000"/>
+                <a:lumMod val="102000"/>
+                <a:tint val="94000"/>
+              </a:schemeClr>
+            </a:gs>
+            <a:gs pos="50000">
+              <a:schemeClr val="phClr">
+                <a:satMod val="110000"/>
+                <a:lumMod val="100000"/>
+                <a:shade val="100000"/>
+              </a:schemeClr>
+            </a:gs>
+            <a:gs pos="100000">
+              <a:schemeClr val="phClr">
+                <a:lumMod val="99000"/>
+                <a:satMod val="120000"/>
+                <a:shade val="78000"/>
+              </a:schemeClr>
+            </a:gs>
+          </a:gsLst>
+          <a:lin ang="5400000" scaled="0"/>
+        </a:gradFill>
+      </a:fillStyleLst>
+      <a:lnStyleLst>
+        <a:ln w="6350" cap="flat" cmpd="sng" algn="ctr">
+          <a:solidFill>
+            <a:schemeClr val="phClr"/>
+          </a:solidFill>
+          <a:prstDash val="solid"/>
+          <a:miter lim="800000"/>
+        </a:ln>
+        <a:ln w="12700" cap="flat" cmpd="sng" algn="ctr">
+          <a:solidFill>
+            <a:schemeClr val="phClr"/>
+          </a:solidFill>
+          <a:prstDash val="solid"/>
+          <a:miter lim="800000"/>
+        </a:ln>
+        <a:ln w="19050" cap="flat" cmpd="sng" algn="ctr">
+          <a:solidFill>
+            <a:schemeClr val="phClr"/>
+          </a:solidFill>
+          <a:prstDash val="solid"/>
+          <a:miter lim="800000"/>
+        </a:ln>
+      </a:lnStyleLst>
+      <a:effectStyleLst>
+        <a:effectStyle>
+          <a:effectLst/>
+        </a:effectStyle>
+        <a:effectStyle>
+          <a:effectLst/>
+        </a:effectStyle>
+        <a:effectStyle>
+          <a:effectLst>
+            <a:outerShdw blurRad="57150" dist="19050" dir="5400000" algn="ctr" rotWithShape="0">
+              <a:srgbClr val="000000">
+                <a:alpha val="63000"/>
+              </a:srgbClr>
+            </a:outerShdw>
+          </a:effectLst>
+        </a:effectStyle>
+      </a:effectStyleLst>
+      <a:bgFillStyleLst>
+        <a:solidFill>
+          <a:schemeClr val="phClr"/>
+        </a:solidFill>
+        <a:solidFill>
+          <a:schemeClr val="phClr">
+            <a:tint val="95000"/>
+            <a:satMod val="170000"/>
+          </a:schemeClr>
+        </a:solidFill>
+        <a:gradFill rotWithShape="1">
+          <a:gsLst>
+            <a:gs pos="0">
+              <a:schemeClr val="phClr">
+                <a:tint val="93000"/>
+                <a:satMod val="150000"/>
+                <a:shade val="98000"/>
+                <a:lumMod val="102000"/>
+              </a:schemeClr>
+            </a:gs>
+            <a:gs pos="50000">
+              <a:schemeClr val="phClr">
+                <a:tint val="98000"/>
+                <a:satMod val="130000"/>
+                <a:shade val="90000"/>
+                <a:lumMod val="103000"/>
+              </a:schemeClr>
+            </a:gs>
+            <a:gs pos="100000">
+              <a:schemeClr val="phClr">
+                <a:shade val="63000"/>
+                <a:satMod val="120000"/>
+              </a:schemeClr>
+            </a:gs>
+          </a:gsLst>
+          <a:lin ang="5400000" scaled="0"/>
+        </a:gradFill>
+      </a:bgFillStyleLst>
+    </a:fmtScheme>
+  </a:themeElements>
+  <a:objectDefaults/>
+  <a:extraClrSchemeLst/>
+  <a:extLst>
+    <a:ext uri="{05A4C25C-085E-4340-85A3-A5531E510DB2}">
+      <thm15:themeFamily xmlns:thm15="http://schemas.microsoft.com/office/thememl/2012/main" name="Office Theme" id="{62F939B6-93AF-4DB8-9C6B-D6C7DFDC589F}" vid="{4A3C46E8-61CC-4603-A589-7422A47A8E4A}"/>
+    </a:ext>
+  </a:extLst>
+</a:theme>
 </file>
</xml_diff>